<commit_message>
modify week 15 ppt
</commit_message>
<xml_diff>
--- a/进度汇报PPT汇总/week15.pptx
+++ b/进度汇报PPT汇总/week15.pptx
@@ -5,22 +5,22 @@
     <p:sldMasterId id="2147483648" r:id="rId1"/>
   </p:sldMasterIdLst>
   <p:notesMasterIdLst>
-    <p:notesMasterId r:id="rId5"/>
+    <p:notesMasterId r:id="rId12"/>
   </p:notesMasterIdLst>
   <p:handoutMasterIdLst>
-    <p:handoutMasterId r:id="rId14"/>
+    <p:handoutMasterId r:id="rId13"/>
   </p:handoutMasterIdLst>
   <p:sldIdLst>
-    <p:sldId id="312" r:id="rId3"/>
-    <p:sldId id="367" r:id="rId4"/>
-    <p:sldId id="375" r:id="rId6"/>
-    <p:sldId id="368" r:id="rId7"/>
-    <p:sldId id="369" r:id="rId8"/>
-    <p:sldId id="370" r:id="rId9"/>
-    <p:sldId id="371" r:id="rId10"/>
-    <p:sldId id="372" r:id="rId11"/>
-    <p:sldId id="373" r:id="rId12"/>
-    <p:sldId id="361" r:id="rId13"/>
+    <p:sldId id="312" r:id="rId2"/>
+    <p:sldId id="367" r:id="rId3"/>
+    <p:sldId id="375" r:id="rId4"/>
+    <p:sldId id="368" r:id="rId5"/>
+    <p:sldId id="369" r:id="rId6"/>
+    <p:sldId id="370" r:id="rId7"/>
+    <p:sldId id="371" r:id="rId8"/>
+    <p:sldId id="372" r:id="rId9"/>
+    <p:sldId id="373" r:id="rId10"/>
+    <p:sldId id="361" r:id="rId11"/>
   </p:sldIdLst>
   <p:sldSz cx="12192000" cy="6858000"/>
   <p:notesSz cx="6858000" cy="9144000"/>
@@ -119,7 +119,57 @@
       </a:defRPr>
     </a:lvl9pPr>
   </p:defaultTextStyle>
+  <p:extLst>
+    <p:ext uri="{EFAFB233-063F-42B5-8137-9DF3F51BA10A}">
+      <p15:sldGuideLst xmlns:p15="http://schemas.microsoft.com/office/powerpoint/2012/main"/>
+    </p:ext>
+  </p:extLst>
 </p:presentation>
+</file>
+
+<file path=ppt/changesInfos/changesInfo1.xml><?xml version="1.0" encoding="utf-8"?>
+<pc:chgInfo xmlns:a="http://schemas.openxmlformats.org/drawingml/2006/main" xmlns:r="http://schemas.openxmlformats.org/officeDocument/2006/relationships" xmlns:ac="http://schemas.microsoft.com/office/drawing/2013/main/command" xmlns:pc="http://schemas.microsoft.com/office/powerpoint/2013/main/command">
+  <pc:docChgLst>
+    <pc:chgData name="snade jack" userId="ba5019ad82b64393" providerId="LiveId" clId="{B7D382CB-AC70-42DF-8486-7509352D376C}"/>
+    <pc:docChg chg="custSel modSld">
+      <pc:chgData name="snade jack" userId="ba5019ad82b64393" providerId="LiveId" clId="{B7D382CB-AC70-42DF-8486-7509352D376C}" dt="2022-06-04T01:28:06.539" v="5" actId="1076"/>
+      <pc:docMkLst>
+        <pc:docMk/>
+      </pc:docMkLst>
+      <pc:sldChg chg="addSp delSp modSp mod">
+        <pc:chgData name="snade jack" userId="ba5019ad82b64393" providerId="LiveId" clId="{B7D382CB-AC70-42DF-8486-7509352D376C}" dt="2022-06-04T01:28:06.539" v="5" actId="1076"/>
+        <pc:sldMkLst>
+          <pc:docMk/>
+          <pc:sldMk cId="0" sldId="370"/>
+        </pc:sldMkLst>
+        <pc:spChg chg="add del mod">
+          <ac:chgData name="snade jack" userId="ba5019ad82b64393" providerId="LiveId" clId="{B7D382CB-AC70-42DF-8486-7509352D376C}" dt="2022-06-04T01:27:51.454" v="1"/>
+          <ac:spMkLst>
+            <pc:docMk/>
+            <pc:sldMk cId="0" sldId="370"/>
+            <ac:spMk id="5" creationId="{315C4D25-28B9-7B2E-68D6-73A13A46C614}"/>
+          </ac:spMkLst>
+        </pc:spChg>
+        <pc:picChg chg="del">
+          <ac:chgData name="snade jack" userId="ba5019ad82b64393" providerId="LiveId" clId="{B7D382CB-AC70-42DF-8486-7509352D376C}" dt="2022-06-04T01:27:42.704" v="0" actId="478"/>
+          <ac:picMkLst>
+            <pc:docMk/>
+            <pc:sldMk cId="0" sldId="370"/>
+            <ac:picMk id="6" creationId="{00000000-0000-0000-0000-000000000000}"/>
+          </ac:picMkLst>
+        </pc:picChg>
+        <pc:picChg chg="add mod">
+          <ac:chgData name="snade jack" userId="ba5019ad82b64393" providerId="LiveId" clId="{B7D382CB-AC70-42DF-8486-7509352D376C}" dt="2022-06-04T01:28:06.539" v="5" actId="1076"/>
+          <ac:picMkLst>
+            <pc:docMk/>
+            <pc:sldMk cId="0" sldId="370"/>
+            <ac:picMk id="8" creationId="{44396F14-5310-6251-0939-884C94E71210}"/>
+          </ac:picMkLst>
+        </pc:picChg>
+      </pc:sldChg>
+    </pc:docChg>
+  </pc:docChgLst>
+</pc:chgInfo>
 </file>
 
 <file path=ppt/handoutMasters/handoutMaster1.xml><?xml version="1.0" encoding="utf-8"?>
@@ -204,6 +254,7 @@
           <a:p>
             <a:fld id="{0F9B84EA-7D68-4D60-9CB1-D50884785D1C}" type="datetimeFigureOut">
               <a:rPr lang="zh-CN" altLang="en-US" smtClean="0"/>
+              <a:t>2022/6/4</a:t>
             </a:fld>
             <a:endParaRPr lang="zh-CN" altLang="en-US"/>
           </a:p>
@@ -269,12 +320,18 @@
           <a:p>
             <a:fld id="{8D4E0FC9-F1F8-4FAE-9988-3BA365CFD46F}" type="slidenum">
               <a:rPr lang="zh-CN" altLang="en-US" smtClean="0"/>
+              <a:t>‹#›</a:t>
             </a:fld>
             <a:endParaRPr lang="zh-CN" altLang="en-US"/>
           </a:p>
         </p:txBody>
       </p:sp>
     </p:spTree>
+    <p:extLst>
+      <p:ext uri="{BB962C8B-B14F-4D97-AF65-F5344CB8AC3E}">
+        <p14:creationId xmlns:p14="http://schemas.microsoft.com/office/powerpoint/2010/main" val="1"/>
+      </p:ext>
+    </p:extLst>
   </p:cSld>
   <p:clrMap bg1="lt1" tx1="dk1" bg2="lt2" tx2="dk2" accent1="accent1" accent2="accent2" accent3="accent3" accent4="accent4" accent5="accent5" accent6="accent6" hlink="hlink" folHlink="folHlink"/>
 </p:handoutMaster>
@@ -362,6 +419,7 @@
           <a:p>
             <a:fld id="{7B4F2CEB-5DF7-4808-8224-1EF646B93121}" type="datetimeFigureOut">
               <a:rPr lang="zh-CN" altLang="en-US" smtClean="0"/>
+              <a:t>2022/6/4</a:t>
             </a:fld>
             <a:endParaRPr lang="zh-CN" altLang="en-US"/>
           </a:p>
@@ -428,7 +486,6 @@
               <a:rPr lang="zh-CN" altLang="en-US"/>
               <a:t>单击此处编辑母版文本样式</a:t>
             </a:r>
-            <a:endParaRPr lang="zh-CN" altLang="en-US"/>
           </a:p>
           <a:p>
             <a:pPr lvl="1"/>
@@ -436,7 +493,6 @@
               <a:rPr lang="zh-CN" altLang="en-US"/>
               <a:t>二级</a:t>
             </a:r>
-            <a:endParaRPr lang="zh-CN" altLang="en-US"/>
           </a:p>
           <a:p>
             <a:pPr lvl="2"/>
@@ -444,7 +500,6 @@
               <a:rPr lang="zh-CN" altLang="en-US"/>
               <a:t>三级</a:t>
             </a:r>
-            <a:endParaRPr lang="zh-CN" altLang="en-US"/>
           </a:p>
           <a:p>
             <a:pPr lvl="3"/>
@@ -452,7 +507,6 @@
               <a:rPr lang="zh-CN" altLang="en-US"/>
               <a:t>四级</a:t>
             </a:r>
-            <a:endParaRPr lang="zh-CN" altLang="en-US"/>
           </a:p>
           <a:p>
             <a:pPr lvl="4"/>
@@ -460,7 +514,6 @@
               <a:rPr lang="zh-CN" altLang="en-US"/>
               <a:t>五级</a:t>
             </a:r>
-            <a:endParaRPr lang="zh-CN" altLang="en-US"/>
           </a:p>
         </p:txBody>
       </p:sp>
@@ -524,6 +577,7 @@
           <a:p>
             <a:fld id="{83AA1F61-0992-4120-A1E9-FA3A21BB776E}" type="slidenum">
               <a:rPr lang="zh-CN" altLang="en-US" smtClean="0"/>
+              <a:t>‹#›</a:t>
             </a:fld>
             <a:endParaRPr lang="zh-CN" altLang="en-US"/>
           </a:p>
@@ -691,7 +745,6 @@
               <a:rPr lang="zh-CN" altLang="en-US"/>
               <a:t>等等</a:t>
             </a:r>
-            <a:endParaRPr lang="zh-CN" altLang="en-US"/>
           </a:p>
         </p:txBody>
       </p:sp>
@@ -748,7 +801,6 @@
               <a:rPr lang="zh-CN" altLang="en-US" dirty="0"/>
               <a:t>单击此处编辑母版标题样式</a:t>
             </a:r>
-            <a:endParaRPr lang="zh-CN" altLang="en-US" dirty="0"/>
           </a:p>
         </p:txBody>
       </p:sp>
@@ -813,7 +865,6 @@
               <a:rPr lang="zh-CN" altLang="en-US"/>
               <a:t>单击此处编辑母版副标题样式</a:t>
             </a:r>
-            <a:endParaRPr lang="zh-CN" altLang="en-US"/>
           </a:p>
         </p:txBody>
       </p:sp>
@@ -834,6 +885,7 @@
           <a:p>
             <a:fld id="{A9482DDB-C4B4-4602-831B-33D7CA22852C}" type="datetime1">
               <a:rPr lang="zh-CN" altLang="en-US" smtClean="0"/>
+              <a:t>2022/6/4</a:t>
             </a:fld>
             <a:endParaRPr lang="zh-CN" altLang="en-US"/>
           </a:p>
@@ -882,6 +934,7 @@
           <a:p>
             <a:fld id="{519AEA81-C1FD-4B2C-87D1-3FA637539CC6}" type="slidenum">
               <a:rPr lang="zh-CN" altLang="en-US" smtClean="0"/>
+              <a:t>‹#›</a:t>
             </a:fld>
             <a:endParaRPr lang="zh-CN" altLang="en-US" dirty="0"/>
           </a:p>
@@ -931,7 +984,6 @@
               <a:rPr lang="zh-CN" altLang="en-US"/>
               <a:t>单击此处编辑母版标题样式</a:t>
             </a:r>
-            <a:endParaRPr lang="zh-CN" altLang="en-US"/>
           </a:p>
         </p:txBody>
       </p:sp>
@@ -955,7 +1007,6 @@
               <a:rPr lang="zh-CN" altLang="en-US"/>
               <a:t>单击此处编辑母版文本样式</a:t>
             </a:r>
-            <a:endParaRPr lang="zh-CN" altLang="en-US"/>
           </a:p>
           <a:p>
             <a:pPr lvl="1"/>
@@ -963,7 +1014,6 @@
               <a:rPr lang="zh-CN" altLang="en-US"/>
               <a:t>二级</a:t>
             </a:r>
-            <a:endParaRPr lang="zh-CN" altLang="en-US"/>
           </a:p>
           <a:p>
             <a:pPr lvl="2"/>
@@ -971,7 +1021,6 @@
               <a:rPr lang="zh-CN" altLang="en-US"/>
               <a:t>三级</a:t>
             </a:r>
-            <a:endParaRPr lang="zh-CN" altLang="en-US"/>
           </a:p>
           <a:p>
             <a:pPr lvl="3"/>
@@ -979,7 +1028,6 @@
               <a:rPr lang="zh-CN" altLang="en-US"/>
               <a:t>四级</a:t>
             </a:r>
-            <a:endParaRPr lang="zh-CN" altLang="en-US"/>
           </a:p>
           <a:p>
             <a:pPr lvl="4"/>
@@ -987,7 +1035,6 @@
               <a:rPr lang="zh-CN" altLang="en-US"/>
               <a:t>五级</a:t>
             </a:r>
-            <a:endParaRPr lang="zh-CN" altLang="en-US"/>
           </a:p>
         </p:txBody>
       </p:sp>
@@ -1008,6 +1055,7 @@
           <a:p>
             <a:fld id="{E9B53CE2-FC60-405A-858E-53FC0D5D5173}" type="datetime1">
               <a:rPr lang="zh-CN" altLang="en-US" smtClean="0"/>
+              <a:t>2022/6/4</a:t>
             </a:fld>
             <a:endParaRPr lang="zh-CN" altLang="en-US"/>
           </a:p>
@@ -1049,6 +1097,7 @@
           <a:p>
             <a:fld id="{519AEA81-C1FD-4B2C-87D1-3FA637539CC6}" type="slidenum">
               <a:rPr lang="zh-CN" altLang="en-US" smtClean="0"/>
+              <a:t>‹#›</a:t>
             </a:fld>
             <a:endParaRPr lang="zh-CN" altLang="en-US"/>
           </a:p>
@@ -1103,7 +1152,6 @@
               <a:rPr lang="zh-CN" altLang="en-US"/>
               <a:t>单击此处编辑母版标题样式</a:t>
             </a:r>
-            <a:endParaRPr lang="zh-CN" altLang="en-US"/>
           </a:p>
         </p:txBody>
       </p:sp>
@@ -1132,7 +1180,6 @@
               <a:rPr lang="zh-CN" altLang="en-US"/>
               <a:t>单击此处编辑母版文本样式</a:t>
             </a:r>
-            <a:endParaRPr lang="zh-CN" altLang="en-US"/>
           </a:p>
           <a:p>
             <a:pPr lvl="1"/>
@@ -1140,7 +1187,6 @@
               <a:rPr lang="zh-CN" altLang="en-US"/>
               <a:t>二级</a:t>
             </a:r>
-            <a:endParaRPr lang="zh-CN" altLang="en-US"/>
           </a:p>
           <a:p>
             <a:pPr lvl="2"/>
@@ -1148,7 +1194,6 @@
               <a:rPr lang="zh-CN" altLang="en-US"/>
               <a:t>三级</a:t>
             </a:r>
-            <a:endParaRPr lang="zh-CN" altLang="en-US"/>
           </a:p>
           <a:p>
             <a:pPr lvl="3"/>
@@ -1156,7 +1201,6 @@
               <a:rPr lang="zh-CN" altLang="en-US"/>
               <a:t>四级</a:t>
             </a:r>
-            <a:endParaRPr lang="zh-CN" altLang="en-US"/>
           </a:p>
           <a:p>
             <a:pPr lvl="4"/>
@@ -1164,7 +1208,6 @@
               <a:rPr lang="zh-CN" altLang="en-US"/>
               <a:t>五级</a:t>
             </a:r>
-            <a:endParaRPr lang="zh-CN" altLang="en-US"/>
           </a:p>
         </p:txBody>
       </p:sp>
@@ -1185,6 +1228,7 @@
           <a:p>
             <a:fld id="{2C0097D1-6629-49F3-8447-AFCF4DA4A258}" type="datetime1">
               <a:rPr lang="zh-CN" altLang="en-US" smtClean="0"/>
+              <a:t>2022/6/4</a:t>
             </a:fld>
             <a:endParaRPr lang="zh-CN" altLang="en-US"/>
           </a:p>
@@ -1226,6 +1270,7 @@
           <a:p>
             <a:fld id="{519AEA81-C1FD-4B2C-87D1-3FA637539CC6}" type="slidenum">
               <a:rPr lang="zh-CN" altLang="en-US" smtClean="0"/>
+              <a:t>‹#›</a:t>
             </a:fld>
             <a:endParaRPr lang="zh-CN" altLang="en-US"/>
           </a:p>
@@ -1275,7 +1320,6 @@
               <a:rPr lang="zh-CN" altLang="en-US"/>
               <a:t>单击此处编辑母版标题样式</a:t>
             </a:r>
-            <a:endParaRPr lang="zh-CN" altLang="en-US"/>
           </a:p>
         </p:txBody>
       </p:sp>
@@ -1299,7 +1343,6 @@
               <a:rPr lang="zh-CN" altLang="en-US"/>
               <a:t>单击此处编辑母版文本样式</a:t>
             </a:r>
-            <a:endParaRPr lang="zh-CN" altLang="en-US"/>
           </a:p>
           <a:p>
             <a:pPr lvl="1"/>
@@ -1307,7 +1350,6 @@
               <a:rPr lang="zh-CN" altLang="en-US"/>
               <a:t>二级</a:t>
             </a:r>
-            <a:endParaRPr lang="zh-CN" altLang="en-US"/>
           </a:p>
           <a:p>
             <a:pPr lvl="2"/>
@@ -1315,7 +1357,6 @@
               <a:rPr lang="zh-CN" altLang="en-US"/>
               <a:t>三级</a:t>
             </a:r>
-            <a:endParaRPr lang="zh-CN" altLang="en-US"/>
           </a:p>
           <a:p>
             <a:pPr lvl="3"/>
@@ -1323,7 +1364,6 @@
               <a:rPr lang="zh-CN" altLang="en-US"/>
               <a:t>四级</a:t>
             </a:r>
-            <a:endParaRPr lang="zh-CN" altLang="en-US"/>
           </a:p>
           <a:p>
             <a:pPr lvl="4"/>
@@ -1331,7 +1371,6 @@
               <a:rPr lang="zh-CN" altLang="en-US"/>
               <a:t>五级</a:t>
             </a:r>
-            <a:endParaRPr lang="zh-CN" altLang="en-US"/>
           </a:p>
         </p:txBody>
       </p:sp>
@@ -1352,6 +1391,7 @@
           <a:p>
             <a:fld id="{91C93C8A-D80A-4DE1-A999-215FD607DBE3}" type="datetime1">
               <a:rPr lang="zh-CN" altLang="en-US" smtClean="0"/>
+              <a:t>2022/6/4</a:t>
             </a:fld>
             <a:endParaRPr lang="zh-CN" altLang="en-US"/>
           </a:p>
@@ -1393,6 +1433,7 @@
           <a:p>
             <a:fld id="{519AEA81-C1FD-4B2C-87D1-3FA637539CC6}" type="slidenum">
               <a:rPr lang="zh-CN" altLang="en-US" smtClean="0"/>
+              <a:t>‹#›</a:t>
             </a:fld>
             <a:endParaRPr lang="zh-CN" altLang="en-US" dirty="0"/>
           </a:p>
@@ -1454,7 +1495,6 @@
               <a:rPr lang="zh-CN" altLang="en-US" dirty="0"/>
               <a:t>单击此处编辑母版标题样式</a:t>
             </a:r>
-            <a:endParaRPr lang="zh-CN" altLang="en-US" dirty="0"/>
           </a:p>
         </p:txBody>
       </p:sp>
@@ -1574,7 +1614,6 @@
               <a:rPr lang="zh-CN" altLang="en-US" dirty="0"/>
               <a:t>单击此处编辑母版文本样式</a:t>
             </a:r>
-            <a:endParaRPr lang="zh-CN" altLang="en-US" dirty="0"/>
           </a:p>
         </p:txBody>
       </p:sp>
@@ -1595,6 +1634,7 @@
           <a:p>
             <a:fld id="{1B426F48-097D-4E21-B763-D29753566D82}" type="datetime1">
               <a:rPr lang="zh-CN" altLang="en-US" smtClean="0"/>
+              <a:t>2022/6/4</a:t>
             </a:fld>
             <a:endParaRPr lang="zh-CN" altLang="en-US"/>
           </a:p>
@@ -1636,6 +1676,7 @@
           <a:p>
             <a:fld id="{519AEA81-C1FD-4B2C-87D1-3FA637539CC6}" type="slidenum">
               <a:rPr lang="zh-CN" altLang="en-US" smtClean="0"/>
+              <a:t>‹#›</a:t>
             </a:fld>
             <a:endParaRPr lang="zh-CN" altLang="en-US"/>
           </a:p>
@@ -1685,7 +1726,6 @@
               <a:rPr lang="zh-CN" altLang="en-US"/>
               <a:t>单击此处编辑母版标题样式</a:t>
             </a:r>
-            <a:endParaRPr lang="zh-CN" altLang="en-US"/>
           </a:p>
         </p:txBody>
       </p:sp>
@@ -1714,7 +1754,6 @@
               <a:rPr lang="zh-CN" altLang="en-US"/>
               <a:t>单击此处编辑母版文本样式</a:t>
             </a:r>
-            <a:endParaRPr lang="zh-CN" altLang="en-US"/>
           </a:p>
           <a:p>
             <a:pPr lvl="1"/>
@@ -1722,7 +1761,6 @@
               <a:rPr lang="zh-CN" altLang="en-US"/>
               <a:t>二级</a:t>
             </a:r>
-            <a:endParaRPr lang="zh-CN" altLang="en-US"/>
           </a:p>
           <a:p>
             <a:pPr lvl="2"/>
@@ -1730,7 +1768,6 @@
               <a:rPr lang="zh-CN" altLang="en-US"/>
               <a:t>三级</a:t>
             </a:r>
-            <a:endParaRPr lang="zh-CN" altLang="en-US"/>
           </a:p>
           <a:p>
             <a:pPr lvl="3"/>
@@ -1738,7 +1775,6 @@
               <a:rPr lang="zh-CN" altLang="en-US"/>
               <a:t>四级</a:t>
             </a:r>
-            <a:endParaRPr lang="zh-CN" altLang="en-US"/>
           </a:p>
           <a:p>
             <a:pPr lvl="4"/>
@@ -1746,7 +1782,6 @@
               <a:rPr lang="zh-CN" altLang="en-US"/>
               <a:t>五级</a:t>
             </a:r>
-            <a:endParaRPr lang="zh-CN" altLang="en-US"/>
           </a:p>
         </p:txBody>
       </p:sp>
@@ -1775,7 +1810,6 @@
               <a:rPr lang="zh-CN" altLang="en-US"/>
               <a:t>单击此处编辑母版文本样式</a:t>
             </a:r>
-            <a:endParaRPr lang="zh-CN" altLang="en-US"/>
           </a:p>
           <a:p>
             <a:pPr lvl="1"/>
@@ -1783,7 +1817,6 @@
               <a:rPr lang="zh-CN" altLang="en-US"/>
               <a:t>二级</a:t>
             </a:r>
-            <a:endParaRPr lang="zh-CN" altLang="en-US"/>
           </a:p>
           <a:p>
             <a:pPr lvl="2"/>
@@ -1791,7 +1824,6 @@
               <a:rPr lang="zh-CN" altLang="en-US"/>
               <a:t>三级</a:t>
             </a:r>
-            <a:endParaRPr lang="zh-CN" altLang="en-US"/>
           </a:p>
           <a:p>
             <a:pPr lvl="3"/>
@@ -1799,7 +1831,6 @@
               <a:rPr lang="zh-CN" altLang="en-US"/>
               <a:t>四级</a:t>
             </a:r>
-            <a:endParaRPr lang="zh-CN" altLang="en-US"/>
           </a:p>
           <a:p>
             <a:pPr lvl="4"/>
@@ -1807,7 +1838,6 @@
               <a:rPr lang="zh-CN" altLang="en-US"/>
               <a:t>五级</a:t>
             </a:r>
-            <a:endParaRPr lang="zh-CN" altLang="en-US"/>
           </a:p>
         </p:txBody>
       </p:sp>
@@ -1828,6 +1858,7 @@
           <a:p>
             <a:fld id="{493A7B37-EF3E-4286-9A7A-8A71F864A976}" type="datetime1">
               <a:rPr lang="zh-CN" altLang="en-US" smtClean="0"/>
+              <a:t>2022/6/4</a:t>
             </a:fld>
             <a:endParaRPr lang="zh-CN" altLang="en-US"/>
           </a:p>
@@ -1869,6 +1900,7 @@
           <a:p>
             <a:fld id="{519AEA81-C1FD-4B2C-87D1-3FA637539CC6}" type="slidenum">
               <a:rPr lang="zh-CN" altLang="en-US" smtClean="0"/>
+              <a:t>‹#›</a:t>
             </a:fld>
             <a:endParaRPr lang="zh-CN" altLang="en-US"/>
           </a:p>
@@ -1923,7 +1955,6 @@
               <a:rPr lang="zh-CN" altLang="en-US"/>
               <a:t>单击此处编辑母版标题样式</a:t>
             </a:r>
-            <a:endParaRPr lang="zh-CN" altLang="en-US"/>
           </a:p>
         </p:txBody>
       </p:sp>
@@ -1989,7 +2020,6 @@
               <a:rPr lang="zh-CN" altLang="en-US"/>
               <a:t>单击此处编辑母版文本样式</a:t>
             </a:r>
-            <a:endParaRPr lang="zh-CN" altLang="en-US"/>
           </a:p>
         </p:txBody>
       </p:sp>
@@ -2018,7 +2048,6 @@
               <a:rPr lang="zh-CN" altLang="en-US"/>
               <a:t>单击此处编辑母版文本样式</a:t>
             </a:r>
-            <a:endParaRPr lang="zh-CN" altLang="en-US"/>
           </a:p>
           <a:p>
             <a:pPr lvl="1"/>
@@ -2026,7 +2055,6 @@
               <a:rPr lang="zh-CN" altLang="en-US"/>
               <a:t>二级</a:t>
             </a:r>
-            <a:endParaRPr lang="zh-CN" altLang="en-US"/>
           </a:p>
           <a:p>
             <a:pPr lvl="2"/>
@@ -2034,7 +2062,6 @@
               <a:rPr lang="zh-CN" altLang="en-US"/>
               <a:t>三级</a:t>
             </a:r>
-            <a:endParaRPr lang="zh-CN" altLang="en-US"/>
           </a:p>
           <a:p>
             <a:pPr lvl="3"/>
@@ -2042,7 +2069,6 @@
               <a:rPr lang="zh-CN" altLang="en-US"/>
               <a:t>四级</a:t>
             </a:r>
-            <a:endParaRPr lang="zh-CN" altLang="en-US"/>
           </a:p>
           <a:p>
             <a:pPr lvl="4"/>
@@ -2050,7 +2076,6 @@
               <a:rPr lang="zh-CN" altLang="en-US"/>
               <a:t>五级</a:t>
             </a:r>
-            <a:endParaRPr lang="zh-CN" altLang="en-US"/>
           </a:p>
         </p:txBody>
       </p:sp>
@@ -2116,7 +2141,6 @@
               <a:rPr lang="zh-CN" altLang="en-US"/>
               <a:t>单击此处编辑母版文本样式</a:t>
             </a:r>
-            <a:endParaRPr lang="zh-CN" altLang="en-US"/>
           </a:p>
         </p:txBody>
       </p:sp>
@@ -2145,7 +2169,6 @@
               <a:rPr lang="zh-CN" altLang="en-US"/>
               <a:t>单击此处编辑母版文本样式</a:t>
             </a:r>
-            <a:endParaRPr lang="zh-CN" altLang="en-US"/>
           </a:p>
           <a:p>
             <a:pPr lvl="1"/>
@@ -2153,7 +2176,6 @@
               <a:rPr lang="zh-CN" altLang="en-US"/>
               <a:t>二级</a:t>
             </a:r>
-            <a:endParaRPr lang="zh-CN" altLang="en-US"/>
           </a:p>
           <a:p>
             <a:pPr lvl="2"/>
@@ -2161,7 +2183,6 @@
               <a:rPr lang="zh-CN" altLang="en-US"/>
               <a:t>三级</a:t>
             </a:r>
-            <a:endParaRPr lang="zh-CN" altLang="en-US"/>
           </a:p>
           <a:p>
             <a:pPr lvl="3"/>
@@ -2169,7 +2190,6 @@
               <a:rPr lang="zh-CN" altLang="en-US"/>
               <a:t>四级</a:t>
             </a:r>
-            <a:endParaRPr lang="zh-CN" altLang="en-US"/>
           </a:p>
           <a:p>
             <a:pPr lvl="4"/>
@@ -2177,7 +2197,6 @@
               <a:rPr lang="zh-CN" altLang="en-US"/>
               <a:t>五级</a:t>
             </a:r>
-            <a:endParaRPr lang="zh-CN" altLang="en-US"/>
           </a:p>
         </p:txBody>
       </p:sp>
@@ -2198,6 +2217,7 @@
           <a:p>
             <a:fld id="{EE865B14-2060-46DE-8771-7F348C538412}" type="datetime1">
               <a:rPr lang="zh-CN" altLang="en-US" smtClean="0"/>
+              <a:t>2022/6/4</a:t>
             </a:fld>
             <a:endParaRPr lang="zh-CN" altLang="en-US"/>
           </a:p>
@@ -2239,6 +2259,7 @@
           <a:p>
             <a:fld id="{519AEA81-C1FD-4B2C-87D1-3FA637539CC6}" type="slidenum">
               <a:rPr lang="zh-CN" altLang="en-US" smtClean="0"/>
+              <a:t>‹#›</a:t>
             </a:fld>
             <a:endParaRPr lang="zh-CN" altLang="en-US"/>
           </a:p>
@@ -2288,7 +2309,6 @@
               <a:rPr lang="zh-CN" altLang="en-US"/>
               <a:t>单击此处编辑母版标题样式</a:t>
             </a:r>
-            <a:endParaRPr lang="zh-CN" altLang="en-US"/>
           </a:p>
         </p:txBody>
       </p:sp>
@@ -2309,6 +2329,7 @@
           <a:p>
             <a:fld id="{85AF00BA-1A83-449D-8AEA-1E736981FE20}" type="datetime1">
               <a:rPr lang="zh-CN" altLang="en-US" smtClean="0"/>
+              <a:t>2022/6/4</a:t>
             </a:fld>
             <a:endParaRPr lang="zh-CN" altLang="en-US"/>
           </a:p>
@@ -2350,6 +2371,7 @@
           <a:p>
             <a:fld id="{519AEA81-C1FD-4B2C-87D1-3FA637539CC6}" type="slidenum">
               <a:rPr lang="zh-CN" altLang="en-US" smtClean="0"/>
+              <a:t>‹#›</a:t>
             </a:fld>
             <a:endParaRPr lang="zh-CN" altLang="en-US"/>
           </a:p>
@@ -2397,6 +2419,7 @@
           <a:p>
             <a:fld id="{65F816BB-10C1-4E24-9BB7-3D382288F272}" type="datetime1">
               <a:rPr lang="zh-CN" altLang="en-US" smtClean="0"/>
+              <a:t>2022/6/4</a:t>
             </a:fld>
             <a:endParaRPr lang="zh-CN" altLang="en-US"/>
           </a:p>
@@ -2438,6 +2461,7 @@
           <a:p>
             <a:fld id="{519AEA81-C1FD-4B2C-87D1-3FA637539CC6}" type="slidenum">
               <a:rPr lang="zh-CN" altLang="en-US" smtClean="0"/>
+              <a:t>‹#›</a:t>
             </a:fld>
             <a:endParaRPr lang="zh-CN" altLang="en-US"/>
           </a:p>
@@ -2496,7 +2520,6 @@
               <a:rPr lang="zh-CN" altLang="en-US"/>
               <a:t>单击此处编辑母版标题样式</a:t>
             </a:r>
-            <a:endParaRPr lang="zh-CN" altLang="en-US"/>
           </a:p>
         </p:txBody>
       </p:sp>
@@ -2553,7 +2576,6 @@
               <a:rPr lang="zh-CN" altLang="en-US"/>
               <a:t>单击此处编辑母版文本样式</a:t>
             </a:r>
-            <a:endParaRPr lang="zh-CN" altLang="en-US"/>
           </a:p>
           <a:p>
             <a:pPr lvl="1"/>
@@ -2561,7 +2583,6 @@
               <a:rPr lang="zh-CN" altLang="en-US"/>
               <a:t>二级</a:t>
             </a:r>
-            <a:endParaRPr lang="zh-CN" altLang="en-US"/>
           </a:p>
           <a:p>
             <a:pPr lvl="2"/>
@@ -2569,7 +2590,6 @@
               <a:rPr lang="zh-CN" altLang="en-US"/>
               <a:t>三级</a:t>
             </a:r>
-            <a:endParaRPr lang="zh-CN" altLang="en-US"/>
           </a:p>
           <a:p>
             <a:pPr lvl="3"/>
@@ -2577,7 +2597,6 @@
               <a:rPr lang="zh-CN" altLang="en-US"/>
               <a:t>四级</a:t>
             </a:r>
-            <a:endParaRPr lang="zh-CN" altLang="en-US"/>
           </a:p>
           <a:p>
             <a:pPr lvl="4"/>
@@ -2585,7 +2604,6 @@
               <a:rPr lang="zh-CN" altLang="en-US"/>
               <a:t>五级</a:t>
             </a:r>
-            <a:endParaRPr lang="zh-CN" altLang="en-US"/>
           </a:p>
         </p:txBody>
       </p:sp>
@@ -2651,7 +2669,6 @@
               <a:rPr lang="zh-CN" altLang="en-US"/>
               <a:t>单击此处编辑母版文本样式</a:t>
             </a:r>
-            <a:endParaRPr lang="zh-CN" altLang="en-US"/>
           </a:p>
         </p:txBody>
       </p:sp>
@@ -2672,6 +2689,7 @@
           <a:p>
             <a:fld id="{EDB3BA1B-C557-45E4-9C66-0434B6B2BC7D}" type="datetime1">
               <a:rPr lang="zh-CN" altLang="en-US" smtClean="0"/>
+              <a:t>2022/6/4</a:t>
             </a:fld>
             <a:endParaRPr lang="zh-CN" altLang="en-US"/>
           </a:p>
@@ -2713,6 +2731,7 @@
           <a:p>
             <a:fld id="{519AEA81-C1FD-4B2C-87D1-3FA637539CC6}" type="slidenum">
               <a:rPr lang="zh-CN" altLang="en-US" smtClean="0"/>
+              <a:t>‹#›</a:t>
             </a:fld>
             <a:endParaRPr lang="zh-CN" altLang="en-US"/>
           </a:p>
@@ -2771,7 +2790,6 @@
               <a:rPr lang="zh-CN" altLang="en-US"/>
               <a:t>单击此处编辑母版标题样式</a:t>
             </a:r>
-            <a:endParaRPr lang="zh-CN" altLang="en-US"/>
           </a:p>
         </p:txBody>
       </p:sp>
@@ -2898,7 +2916,6 @@
               <a:rPr lang="zh-CN" altLang="en-US"/>
               <a:t>单击此处编辑母版文本样式</a:t>
             </a:r>
-            <a:endParaRPr lang="zh-CN" altLang="en-US"/>
           </a:p>
         </p:txBody>
       </p:sp>
@@ -2919,6 +2936,7 @@
           <a:p>
             <a:fld id="{1940BD16-E0DE-4D56-BE59-0FECC58F0719}" type="datetime1">
               <a:rPr lang="zh-CN" altLang="en-US" smtClean="0"/>
+              <a:t>2022/6/4</a:t>
             </a:fld>
             <a:endParaRPr lang="zh-CN" altLang="en-US"/>
           </a:p>
@@ -2960,6 +2978,7 @@
           <a:p>
             <a:fld id="{519AEA81-C1FD-4B2C-87D1-3FA637539CC6}" type="slidenum">
               <a:rPr lang="zh-CN" altLang="en-US" smtClean="0"/>
+              <a:t>‹#›</a:t>
             </a:fld>
             <a:endParaRPr lang="zh-CN" altLang="en-US"/>
           </a:p>
@@ -3024,7 +3043,6 @@
               <a:rPr lang="zh-CN" altLang="en-US" dirty="0"/>
               <a:t>单击此处编辑母版标题样式</a:t>
             </a:r>
-            <a:endParaRPr lang="zh-CN" altLang="en-US" dirty="0"/>
           </a:p>
         </p:txBody>
       </p:sp>
@@ -3058,7 +3076,6 @@
               <a:rPr lang="zh-CN" altLang="en-US" dirty="0"/>
               <a:t>单击此处编辑母版文本样式</a:t>
             </a:r>
-            <a:endParaRPr lang="zh-CN" altLang="en-US" dirty="0"/>
           </a:p>
           <a:p>
             <a:pPr lvl="1"/>
@@ -3066,7 +3083,6 @@
               <a:rPr lang="zh-CN" altLang="en-US" dirty="0"/>
               <a:t>二级</a:t>
             </a:r>
-            <a:endParaRPr lang="zh-CN" altLang="en-US" dirty="0"/>
           </a:p>
           <a:p>
             <a:pPr lvl="2"/>
@@ -3074,7 +3090,6 @@
               <a:rPr lang="zh-CN" altLang="en-US" dirty="0"/>
               <a:t>三级</a:t>
             </a:r>
-            <a:endParaRPr lang="zh-CN" altLang="en-US" dirty="0"/>
           </a:p>
           <a:p>
             <a:pPr lvl="3"/>
@@ -3082,7 +3097,6 @@
               <a:rPr lang="zh-CN" altLang="en-US" dirty="0"/>
               <a:t>四级</a:t>
             </a:r>
-            <a:endParaRPr lang="zh-CN" altLang="en-US" dirty="0"/>
           </a:p>
           <a:p>
             <a:pPr lvl="4"/>
@@ -3090,7 +3104,6 @@
               <a:rPr lang="zh-CN" altLang="en-US" dirty="0"/>
               <a:t>五级</a:t>
             </a:r>
-            <a:endParaRPr lang="zh-CN" altLang="en-US" dirty="0"/>
           </a:p>
         </p:txBody>
       </p:sp>
@@ -3129,6 +3142,7 @@
           <a:p>
             <a:fld id="{A1C7E667-A427-4A7F-A6E1-89474718F88F}" type="datetime1">
               <a:rPr lang="zh-CN" altLang="en-US" smtClean="0"/>
+              <a:t>2022/6/4</a:t>
             </a:fld>
             <a:endParaRPr lang="zh-CN" altLang="en-US"/>
           </a:p>
@@ -3206,6 +3220,7 @@
           <a:p>
             <a:fld id="{519AEA81-C1FD-4B2C-87D1-3FA637539CC6}" type="slidenum">
               <a:rPr lang="zh-CN" altLang="en-US" smtClean="0"/>
+              <a:t>‹#›</a:t>
             </a:fld>
             <a:endParaRPr lang="zh-CN" altLang="en-US"/>
           </a:p>
@@ -3601,7 +3616,6 @@
               <a:rPr lang="zh-CN" altLang="en-US" dirty="0"/>
               <a:t>进度汇报</a:t>
             </a:r>
-            <a:endParaRPr lang="zh-CN" altLang="en-US" dirty="0"/>
           </a:p>
         </p:txBody>
       </p:sp>
@@ -3624,7 +3638,6 @@
               <a:rPr lang="zh-CN" altLang="en-US" dirty="0"/>
               <a:t>刘松铭 于子淳</a:t>
             </a:r>
-            <a:endParaRPr lang="zh-CN" altLang="en-US" dirty="0"/>
           </a:p>
         </p:txBody>
       </p:sp>
@@ -3645,6 +3658,7 @@
           <a:p>
             <a:fld id="{519AEA81-C1FD-4B2C-87D1-3FA637539CC6}" type="slidenum">
               <a:rPr lang="zh-CN" altLang="en-US" smtClean="0"/>
+              <a:t>1</a:t>
             </a:fld>
             <a:endParaRPr lang="zh-CN" altLang="en-US" dirty="0"/>
           </a:p>
@@ -3717,7 +3731,6 @@
               <a:rPr lang="zh-CN" altLang="en-US"/>
               <a:t>感谢张译仁助教的鼎力支持！</a:t>
             </a:r>
-            <a:endParaRPr lang="zh-CN" altLang="en-US"/>
           </a:p>
         </p:txBody>
       </p:sp>
@@ -3738,6 +3751,7 @@
           <a:p>
             <a:fld id="{519AEA81-C1FD-4B2C-87D1-3FA637539CC6}" type="slidenum">
               <a:rPr lang="zh-CN" altLang="en-US" smtClean="0"/>
+              <a:t>10</a:t>
             </a:fld>
             <a:endParaRPr lang="zh-CN" altLang="en-US" dirty="0"/>
           </a:p>
@@ -3787,7 +3801,6 @@
               <a:rPr lang="zh-CN" altLang="en-US" dirty="0"/>
               <a:t>进度汇报</a:t>
             </a:r>
-            <a:endParaRPr lang="zh-CN" altLang="en-US" dirty="0"/>
           </a:p>
         </p:txBody>
       </p:sp>
@@ -3817,7 +3830,6 @@
               <a:rPr lang="zh-CN" altLang="en-US" dirty="0"/>
               <a:t>于子淳</a:t>
             </a:r>
-            <a:endParaRPr lang="zh-CN" altLang="en-US" dirty="0"/>
           </a:p>
           <a:p>
             <a:r>
@@ -3828,13 +3840,8 @@
             </a:r>
             <a:r>
               <a:rPr lang="zh-CN" altLang="en-US" dirty="0"/>
-              <a:t> </a:t>
-            </a:r>
-            <a:r>
-              <a:rPr lang="zh-CN" altLang="en-US" dirty="0"/>
-              <a:t>分支</a:t>
-            </a:r>
-            <a:endParaRPr lang="zh-CN" altLang="en-US" dirty="0"/>
+              <a:t> 分支</a:t>
+            </a:r>
           </a:p>
           <a:p>
             <a:pPr lvl="1"/>
@@ -3844,19 +3851,12 @@
               </a:rPr>
               <a:t>对上周更新后的单核/多核调度器和主线 zCore 做适配，通过 CI</a:t>
             </a:r>
-            <a:endParaRPr lang="zh-CN" altLang="en-US" dirty="0">
-              <a:sym typeface="+mn-ea"/>
-            </a:endParaRPr>
           </a:p>
           <a:p>
             <a:pPr lvl="1"/>
             <a:r>
               <a:rPr lang="zh-CN" altLang="en-US" dirty="0"/>
-              <a:t>在</a:t>
-            </a:r>
-            <a:r>
-              <a:rPr lang="zh-CN" altLang="en-US" dirty="0"/>
-              <a:t>内存 </a:t>
+              <a:t>在内存 </a:t>
             </a:r>
             <a:r>
               <a:rPr lang="en-US" altLang="zh-CN" dirty="0"/>
@@ -3866,19 +3866,13 @@
               <a:rPr lang="zh-CN" altLang="en-US" dirty="0"/>
               <a:t>Qemu 上跑通集成 libc-test 测例（单核/多核调度器）</a:t>
             </a:r>
-            <a:endParaRPr lang="zh-CN" altLang="en-US" dirty="0"/>
           </a:p>
           <a:p>
             <a:pPr lvl="1"/>
             <a:r>
               <a:rPr lang="zh-CN" altLang="en-US" dirty="0"/>
-              <a:t>在集成测例的过程中，修复了原用户库中系统调用与 zCore 规范不一致的问题，用更新后的</a:t>
-            </a:r>
-            <a:r>
-              <a:rPr lang="zh-CN" altLang="en-US" dirty="0"/>
-              <a:t>用户库新建仓库 zcore-user 并撰写说明文档，保留了大部分常用的系统调用接口（符合 zCore 规范）</a:t>
-            </a:r>
-            <a:endParaRPr lang="zh-CN" altLang="en-US" dirty="0"/>
+              <a:t>在集成测例的过程中，修复了原用户库中系统调用与 zCore 规范不一致的问题，用更新后的用户库新建仓库 zcore-user 并撰写说明文档，保留了大部分常用的系统调用接口（符合 zCore 规范）</a:t>
+            </a:r>
           </a:p>
           <a:p>
             <a:r>
@@ -3889,7 +3883,6 @@
               <a:rPr lang="zh-CN" altLang="en-US" dirty="0"/>
               <a:t>分支</a:t>
             </a:r>
-            <a:endParaRPr lang="zh-CN" altLang="en-US" dirty="0"/>
           </a:p>
           <a:p>
             <a:pPr lvl="1"/>
@@ -3913,13 +3906,8 @@
             </a:r>
             <a:r>
               <a:rPr lang="zh-CN" altLang="en-US" dirty="0"/>
-              <a:t>U740 全部</a:t>
-            </a:r>
-            <a:r>
-              <a:rPr lang="zh-CN" altLang="en-US" dirty="0"/>
-              <a:t>通过集成 libc-test 测例</a:t>
-            </a:r>
-            <a:endParaRPr lang="zh-CN" altLang="en-US" dirty="0"/>
+              <a:t>U740 全部通过集成 libc-test 测例</a:t>
+            </a:r>
           </a:p>
           <a:p>
             <a:endParaRPr lang="zh-CN" altLang="en-US" dirty="0"/>
@@ -3946,6 +3934,7 @@
           <a:p>
             <a:fld id="{519AEA81-C1FD-4B2C-87D1-3FA637539CC6}" type="slidenum">
               <a:rPr lang="zh-CN" altLang="en-US" smtClean="0"/>
+              <a:t>2</a:t>
             </a:fld>
             <a:endParaRPr lang="zh-CN" altLang="en-US" dirty="0"/>
           </a:p>
@@ -3968,7 +3957,14 @@
         <p:cNvGrpSpPr/>
         <p:nvPr/>
       </p:nvGrpSpPr>
-      <p:grpSpPr/>
+      <p:grpSpPr>
+        <a:xfrm>
+          <a:off x="0" y="0"/>
+          <a:ext cx="0" cy="0"/>
+          <a:chOff x="0" y="0"/>
+          <a:chExt cx="0" cy="0"/>
+        </a:xfrm>
+      </p:grpSpPr>
       <p:sp>
         <p:nvSpPr>
           <p:cNvPr id="2" name="标题 1"/>
@@ -3982,6 +3978,7 @@
         <p:spPr/>
         <p:txBody>
           <a:bodyPr/>
+          <a:lstStyle/>
           <a:p>
             <a:endParaRPr lang="zh-CN" altLang="en-US"/>
           </a:p>
@@ -4000,6 +3997,7 @@
         <p:spPr/>
         <p:txBody>
           <a:bodyPr/>
+          <a:lstStyle/>
           <a:p>
             <a:endParaRPr lang="zh-CN" altLang="en-US"/>
           </a:p>
@@ -4018,9 +4016,11 @@
         <p:spPr/>
         <p:txBody>
           <a:bodyPr/>
+          <a:lstStyle/>
           <a:p>
             <a:fld id="{519AEA81-C1FD-4B2C-87D1-3FA637539CC6}" type="slidenum">
               <a:rPr lang="zh-CN" altLang="en-US" smtClean="0"/>
+              <a:t>3</a:t>
             </a:fld>
             <a:endParaRPr lang="zh-CN" altLang="en-US" dirty="0"/>
           </a:p>
@@ -4035,7 +4035,7 @@
           <p:nvPr/>
         </p:nvPicPr>
         <p:blipFill>
-          <a:blip r:embed="rId1"/>
+          <a:blip r:embed="rId2"/>
           <a:stretch>
             <a:fillRect/>
           </a:stretch>
@@ -4059,7 +4059,7 @@
           <p:nvPr/>
         </p:nvPicPr>
         <p:blipFill>
-          <a:blip r:embed="rId2"/>
+          <a:blip r:embed="rId3"/>
           <a:stretch>
             <a:fillRect/>
           </a:stretch>
@@ -4238,7 +4238,6 @@
               <a:rPr lang="zh-CN" altLang="en-US" dirty="0"/>
               <a:t>进度汇报</a:t>
             </a:r>
-            <a:endParaRPr lang="zh-CN" altLang="en-US" dirty="0"/>
           </a:p>
         </p:txBody>
       </p:sp>
@@ -4272,7 +4271,6 @@
               <a:rPr lang="en-US" altLang="zh-CN" dirty="0"/>
               <a:t>bug</a:t>
             </a:r>
-            <a:endParaRPr lang="en-US" altLang="zh-CN" dirty="0"/>
           </a:p>
           <a:p>
             <a:pPr lvl="1"/>
@@ -4399,7 +4397,6 @@
               <a:rPr lang="en-US" altLang="zh-CN" dirty="0"/>
               <a:t>info!()</a:t>
             </a:r>
-            <a:endParaRPr lang="en-US" altLang="zh-CN" dirty="0"/>
           </a:p>
         </p:txBody>
       </p:sp>
@@ -4420,6 +4417,7 @@
           <a:p>
             <a:fld id="{519AEA81-C1FD-4B2C-87D1-3FA637539CC6}" type="slidenum">
               <a:rPr lang="zh-CN" altLang="en-US" smtClean="0"/>
+              <a:t>4</a:t>
             </a:fld>
             <a:endParaRPr lang="zh-CN" altLang="en-US" dirty="0"/>
           </a:p>
@@ -4469,7 +4467,6 @@
               <a:rPr lang="zh-CN" altLang="en-US" dirty="0"/>
               <a:t>进度汇报</a:t>
             </a:r>
-            <a:endParaRPr lang="zh-CN" altLang="en-US" dirty="0"/>
           </a:p>
         </p:txBody>
       </p:sp>
@@ -4527,7 +4524,7 @@
             <a:pPr lvl="1"/>
             <a:r>
               <a:rPr lang="en-US" altLang="zh-CN" dirty="0">
-                <a:hlinkClick r:id="rId1"/>
+                <a:hlinkClick r:id="rId2"/>
               </a:rPr>
               <a:t>kernel-sync</a:t>
             </a:r>
@@ -4537,7 +4534,7 @@
             </a:r>
             <a:r>
               <a:rPr lang="en-US" altLang="zh-CN" dirty="0" err="1">
-                <a:hlinkClick r:id="rId2"/>
+                <a:hlinkClick r:id="rId3"/>
               </a:rPr>
               <a:t>PreemptiveScheduler</a:t>
             </a:r>
@@ -4569,7 +4566,6 @@
               <a:rPr lang="en-US" altLang="zh-CN" dirty="0"/>
               <a:t>1,2,3,4</a:t>
             </a:r>
-            <a:endParaRPr lang="en-US" altLang="zh-CN" dirty="0"/>
           </a:p>
           <a:p>
             <a:pPr lvl="1"/>
@@ -4639,7 +4635,6 @@
               <a:rPr lang="en-US" altLang="zh-CN" dirty="0"/>
               <a:t>-test</a:t>
             </a:r>
-            <a:endParaRPr lang="en-US" altLang="zh-CN" dirty="0"/>
           </a:p>
           <a:p>
             <a:pPr lvl="1"/>
@@ -4662,7 +4657,6 @@
               <a:rPr lang="zh-CN" altLang="en-US" dirty="0"/>
               <a:t>的过程已经整理成文档</a:t>
             </a:r>
-            <a:endParaRPr lang="zh-CN" altLang="en-US" dirty="0"/>
           </a:p>
         </p:txBody>
       </p:sp>
@@ -4683,6 +4677,7 @@
           <a:p>
             <a:fld id="{519AEA81-C1FD-4B2C-87D1-3FA637539CC6}" type="slidenum">
               <a:rPr lang="zh-CN" altLang="en-US" smtClean="0"/>
+              <a:t>5</a:t>
             </a:fld>
             <a:endParaRPr lang="zh-CN" altLang="en-US" dirty="0"/>
           </a:p>
@@ -4697,7 +4692,7 @@
           <p:nvPr/>
         </p:nvPicPr>
         <p:blipFill>
-          <a:blip r:embed="rId3">
+          <a:blip r:embed="rId4">
             <a:extLst>
               <a:ext uri="{28A0092B-C50C-407E-A947-70E740481C1C}">
                 <a14:useLocalDpi xmlns:a14="http://schemas.microsoft.com/office/drawing/2010/main" val="0"/>
@@ -4837,9 +4832,38 @@
           </a:p>
         </p:txBody>
       </p:sp>
+      <p:sp>
+        <p:nvSpPr>
+          <p:cNvPr id="4" name="灯片编号占位符 3"/>
+          <p:cNvSpPr>
+            <a:spLocks noGrp="1"/>
+          </p:cNvSpPr>
+          <p:nvPr>
+            <p:ph type="sldNum" sz="quarter" idx="12"/>
+          </p:nvPr>
+        </p:nvSpPr>
+        <p:spPr/>
+        <p:txBody>
+          <a:bodyPr/>
+          <a:lstStyle/>
+          <a:p>
+            <a:fld id="{519AEA81-C1FD-4B2C-87D1-3FA637539CC6}" type="slidenum">
+              <a:rPr lang="zh-CN" altLang="en-US" smtClean="0"/>
+              <a:t>6</a:t>
+            </a:fld>
+            <a:endParaRPr lang="zh-CN" altLang="en-US" dirty="0"/>
+          </a:p>
+        </p:txBody>
+      </p:sp>
       <p:pic>
         <p:nvPicPr>
-          <p:cNvPr id="6" name="内容占位符 5"/>
+          <p:cNvPr id="8" name="内容占位符 7">
+            <a:extLst>
+              <a:ext uri="{FF2B5EF4-FFF2-40B4-BE49-F238E27FC236}">
+                <a16:creationId xmlns:a16="http://schemas.microsoft.com/office/drawing/2014/main" id="{44396F14-5310-6251-0939-884C94E71210}"/>
+              </a:ext>
+            </a:extLst>
+          </p:cNvPr>
           <p:cNvPicPr>
             <a:picLocks noGrp="1" noChangeAspect="1"/>
           </p:cNvPicPr>
@@ -4848,7 +4872,7 @@
           </p:nvPr>
         </p:nvPicPr>
         <p:blipFill>
-          <a:blip r:embed="rId1">
+          <a:blip r:embed="rId2">
             <a:extLst>
               <a:ext uri="{28A0092B-C50C-407E-A947-70E740481C1C}">
                 <a14:useLocalDpi xmlns:a14="http://schemas.microsoft.com/office/drawing/2010/main" val="0"/>
@@ -4866,28 +4890,6 @@
           </a:xfrm>
         </p:spPr>
       </p:pic>
-      <p:sp>
-        <p:nvSpPr>
-          <p:cNvPr id="4" name="灯片编号占位符 3"/>
-          <p:cNvSpPr>
-            <a:spLocks noGrp="1"/>
-          </p:cNvSpPr>
-          <p:nvPr>
-            <p:ph type="sldNum" sz="quarter" idx="12"/>
-          </p:nvPr>
-        </p:nvSpPr>
-        <p:spPr/>
-        <p:txBody>
-          <a:bodyPr/>
-          <a:lstStyle/>
-          <a:p>
-            <a:fld id="{519AEA81-C1FD-4B2C-87D1-3FA637539CC6}" type="slidenum">
-              <a:rPr lang="zh-CN" altLang="en-US" smtClean="0"/>
-            </a:fld>
-            <a:endParaRPr lang="zh-CN" altLang="en-US" dirty="0"/>
-          </a:p>
-        </p:txBody>
-      </p:sp>
     </p:spTree>
   </p:cSld>
   <p:clrMapOvr>
@@ -4943,7 +4945,7 @@
           </p:nvPr>
         </p:nvPicPr>
         <p:blipFill>
-          <a:blip r:embed="rId1">
+          <a:blip r:embed="rId2">
             <a:extLst>
               <a:ext uri="{28A0092B-C50C-407E-A947-70E740481C1C}">
                 <a14:useLocalDpi xmlns:a14="http://schemas.microsoft.com/office/drawing/2010/main" val="0"/>
@@ -4978,6 +4980,7 @@
           <a:p>
             <a:fld id="{519AEA81-C1FD-4B2C-87D1-3FA637539CC6}" type="slidenum">
               <a:rPr lang="zh-CN" altLang="en-US" smtClean="0"/>
+              <a:t>7</a:t>
             </a:fld>
             <a:endParaRPr lang="zh-CN" altLang="en-US" dirty="0"/>
           </a:p>
@@ -5027,7 +5030,6 @@
               <a:rPr lang="zh-CN" altLang="en-US" dirty="0"/>
               <a:t>目前问题</a:t>
             </a:r>
-            <a:endParaRPr lang="zh-CN" altLang="en-US" dirty="0"/>
           </a:p>
         </p:txBody>
       </p:sp>
@@ -5113,7 +5115,6 @@
               <a:rPr lang="en-US" altLang="zh-CN" dirty="0"/>
               <a:t>zCore/src/platform/riscv/entry.rs</a:t>
             </a:r>
-            <a:endParaRPr lang="en-US" altLang="zh-CN" dirty="0"/>
           </a:p>
           <a:p>
             <a:r>
@@ -5149,6 +5150,7 @@
           <a:p>
             <a:fld id="{519AEA81-C1FD-4B2C-87D1-3FA637539CC6}" type="slidenum">
               <a:rPr lang="zh-CN" altLang="en-US" smtClean="0"/>
+              <a:t>8</a:t>
             </a:fld>
             <a:endParaRPr lang="zh-CN" altLang="en-US" dirty="0"/>
           </a:p>
@@ -5163,7 +5165,7 @@
           <p:nvPr/>
         </p:nvPicPr>
         <p:blipFill>
-          <a:blip r:embed="rId1">
+          <a:blip r:embed="rId2">
             <a:extLst>
               <a:ext uri="{28A0092B-C50C-407E-A947-70E740481C1C}">
                 <a14:useLocalDpi xmlns:a14="http://schemas.microsoft.com/office/drawing/2010/main" val="0"/>
@@ -5228,7 +5230,6 @@
               <a:rPr lang="zh-CN" altLang="en-US" dirty="0"/>
               <a:t>下一步计划</a:t>
             </a:r>
-            <a:endParaRPr lang="zh-CN" altLang="en-US" dirty="0"/>
           </a:p>
         </p:txBody>
       </p:sp>
@@ -5290,6 +5291,7 @@
           <a:p>
             <a:fld id="{519AEA81-C1FD-4B2C-87D1-3FA637539CC6}" type="slidenum">
               <a:rPr lang="zh-CN" altLang="en-US" smtClean="0"/>
+              <a:t>9</a:t>
             </a:fld>
             <a:endParaRPr lang="zh-CN" altLang="en-US" dirty="0"/>
           </a:p>
@@ -5627,6 +5629,7 @@
       </a:lstStyle>
     </a:txDef>
   </a:objectDefaults>
+  <a:extraClrSchemeLst/>
   <a:extLst>
     <a:ext uri="{05A4C25C-085E-4340-85A3-A5531E510DB2}">
       <thm15:themeFamily xmlns:thm15="http://schemas.microsoft.com/office/thememl/2012/main" name="Office Theme" id="{62F939B6-93AF-4DB8-9C6B-D6C7DFDC589F}" vid="{4A3C46E8-61CC-4603-A589-7422A47A8E4A}"/>
@@ -5886,6 +5889,8 @@
       </a:bgFillStyleLst>
     </a:fmtScheme>
   </a:themeElements>
+  <a:objectDefaults/>
+  <a:extraClrSchemeLst/>
   <a:extLst>
     <a:ext uri="{05A4C25C-085E-4340-85A3-A5531E510DB2}">
       <thm15:themeFamily xmlns:thm15="http://schemas.microsoft.com/office/thememl/2012/main" name="Office Theme" id="{62F939B6-93AF-4DB8-9C6B-D6C7DFDC589F}" vid="{4A3C46E8-61CC-4603-A589-7422A47A8E4A}"/>
@@ -6145,6 +6150,8 @@
       </a:bgFillStyleLst>
     </a:fmtScheme>
   </a:themeElements>
+  <a:objectDefaults/>
+  <a:extraClrSchemeLst/>
   <a:extLst>
     <a:ext uri="{05A4C25C-085E-4340-85A3-A5531E510DB2}">
       <thm15:themeFamily xmlns:thm15="http://schemas.microsoft.com/office/thememl/2012/main" name="Office Theme" id="{62F939B6-93AF-4DB8-9C6B-D6C7DFDC589F}" vid="{4A3C46E8-61CC-4603-A589-7422A47A8E4A}"/>

</xml_diff>